<commit_message>
needs a bit more detail
</commit_message>
<xml_diff>
--- a/DO_FUD.pptx
+++ b/DO_FUD.pptx
@@ -5,13 +5,15 @@
     <p:sldMasterId id="2147483660" r:id="rId1"/>
   </p:sldMasterIdLst>
   <p:notesMasterIdLst>
-    <p:notesMasterId r:id="rId6"/>
+    <p:notesMasterId r:id="rId8"/>
   </p:notesMasterIdLst>
   <p:sldIdLst>
     <p:sldId id="256" r:id="rId2"/>
     <p:sldId id="257" r:id="rId3"/>
     <p:sldId id="259" r:id="rId4"/>
     <p:sldId id="258" r:id="rId5"/>
+    <p:sldId id="260" r:id="rId6"/>
+    <p:sldId id="261" r:id="rId7"/>
   </p:sldIdLst>
   <p:sldSz cx="12192000" cy="6858000"/>
   <p:notesSz cx="6858000" cy="9144000"/>
@@ -110,6 +112,11 @@
       </a:defRPr>
     </a:lvl9pPr>
   </p:defaultTextStyle>
+  <p:extLst>
+    <p:ext uri="{EFAFB233-063F-42B5-8137-9DF3F51BA10A}">
+      <p15:sldGuideLst xmlns:p15="http://schemas.microsoft.com/office/powerpoint/2012/main"/>
+    </p:ext>
+  </p:extLst>
 </p:presentation>
 </file>
 
@@ -195,7 +202,7 @@
           <a:p>
             <a:fld id="{A0D3C686-5C6A-49E9-A04E-69E92E34BE9E}" type="datetimeFigureOut">
               <a:rPr lang="fr-FR" smtClean="0"/>
-              <a:t>03/02/2022</a:t>
+              <a:t>04/02/2022</a:t>
             </a:fld>
             <a:endParaRPr lang="fr-FR"/>
           </a:p>
@@ -1105,38 +1112,87 @@
           <a:lstStyle/>
           <a:p>
             <a:r>
-              <a:rPr lang="en-CH" dirty="0"/>
-              <a:t>Enticement: “You need the Alpha Pro Premium S+ Enterprise License for that software”</a:t>
-            </a:r>
-            <a:br>
-              <a:rPr lang="en-CH" dirty="0"/>
-            </a:br>
-            <a:r>
-              <a:rPr lang="en-CH" dirty="0"/>
-              <a:t>Clickbait: “Top 10 Home Appliances You Mistakenly Thought Were Safe”</a:t>
-            </a:r>
-          </a:p>
-          <a:p>
-            <a:r>
-              <a:rPr lang="en-CH" dirty="0" err="1"/>
-              <a:t>Vaporware</a:t>
-            </a:r>
-            <a:r>
-              <a:rPr lang="en-CH" dirty="0"/>
-              <a:t>: “We will be releasing X (specs)” one week before competitor announces Y (stealing thunder)</a:t>
-            </a:r>
-          </a:p>
-          <a:p>
-            <a:r>
-              <a:rPr lang="en-CH" dirty="0"/>
-              <a:t>Sense of Urgency: “13 other customers are looking at this *right now*”</a:t>
-            </a:r>
-          </a:p>
-          <a:p>
-            <a:r>
-              <a:rPr lang="en-CH" dirty="0"/>
-              <a:t>“Why would you get X when it doesn’t do Y that our software does?”</a:t>
-            </a:r>
+              <a:rPr lang="fr-FR" dirty="0"/>
+              <a:t>« X Nation State </a:t>
+            </a:r>
+            <a:r>
+              <a:rPr lang="fr-FR" dirty="0" err="1"/>
+              <a:t>is</a:t>
+            </a:r>
+            <a:r>
+              <a:rPr lang="fr-FR" dirty="0"/>
+              <a:t> </a:t>
+            </a:r>
+            <a:r>
+              <a:rPr lang="fr-FR" dirty="0" err="1"/>
+              <a:t>attacking</a:t>
+            </a:r>
+            <a:r>
+              <a:rPr lang="fr-FR" dirty="0"/>
+              <a:t> »</a:t>
+            </a:r>
+          </a:p>
+          <a:p>
+            <a:r>
+              <a:rPr lang="fr-FR" dirty="0"/>
+              <a:t>« Log4j </a:t>
+            </a:r>
+            <a:r>
+              <a:rPr lang="fr-FR" dirty="0" err="1"/>
+              <a:t>is</a:t>
+            </a:r>
+            <a:r>
+              <a:rPr lang="fr-FR" dirty="0"/>
+              <a:t> the </a:t>
+            </a:r>
+            <a:r>
+              <a:rPr lang="fr-FR" dirty="0" err="1"/>
+              <a:t>worst</a:t>
+            </a:r>
+            <a:r>
+              <a:rPr lang="fr-FR" dirty="0"/>
+              <a:t> </a:t>
+            </a:r>
+            <a:r>
+              <a:rPr lang="fr-FR" dirty="0" err="1"/>
+              <a:t>vuln</a:t>
+            </a:r>
+            <a:r>
+              <a:rPr lang="fr-FR" dirty="0"/>
+              <a:t> </a:t>
+            </a:r>
+            <a:r>
+              <a:rPr lang="fr-FR" dirty="0" err="1"/>
+              <a:t>we’ve</a:t>
+            </a:r>
+            <a:r>
+              <a:rPr lang="fr-FR" dirty="0"/>
+              <a:t> </a:t>
+            </a:r>
+            <a:r>
+              <a:rPr lang="fr-FR" dirty="0" err="1"/>
+              <a:t>ever</a:t>
+            </a:r>
+            <a:r>
+              <a:rPr lang="fr-FR" dirty="0"/>
+              <a:t> </a:t>
+            </a:r>
+            <a:r>
+              <a:rPr lang="fr-FR" dirty="0" err="1"/>
+              <a:t>seen</a:t>
+            </a:r>
+            <a:r>
+              <a:rPr lang="fr-FR" dirty="0"/>
+              <a:t> »</a:t>
+            </a:r>
+          </a:p>
+          <a:p>
+            <a:endParaRPr lang="fr-FR" dirty="0"/>
+          </a:p>
+          <a:p>
+            <a:endParaRPr lang="fr-FR" dirty="0"/>
+          </a:p>
+          <a:p>
             <a:endParaRPr lang="fr-FR" dirty="0"/>
           </a:p>
         </p:txBody>
@@ -1168,6 +1224,294 @@
     <p:extLst>
       <p:ext uri="{BB962C8B-B14F-4D97-AF65-F5344CB8AC3E}">
         <p14:creationId xmlns:p14="http://schemas.microsoft.com/office/powerpoint/2010/main" val="3346892072"/>
+      </p:ext>
+    </p:extLst>
+  </p:cSld>
+  <p:clrMapOvr>
+    <a:masterClrMapping/>
+  </p:clrMapOvr>
+</p:notes>
+</file>
+
+<file path=ppt/notesSlides/notesSlide5.xml><?xml version="1.0" encoding="utf-8"?>
+<p:notes xmlns:a="http://schemas.openxmlformats.org/drawingml/2006/main" xmlns:r="http://schemas.openxmlformats.org/officeDocument/2006/relationships" xmlns:p="http://schemas.openxmlformats.org/presentationml/2006/main">
+  <p:cSld>
+    <p:spTree>
+      <p:nvGrpSpPr>
+        <p:cNvPr id="1" name=""/>
+        <p:cNvGrpSpPr/>
+        <p:nvPr/>
+      </p:nvGrpSpPr>
+      <p:grpSpPr>
+        <a:xfrm>
+          <a:off x="0" y="0"/>
+          <a:ext cx="0" cy="0"/>
+          <a:chOff x="0" y="0"/>
+          <a:chExt cx="0" cy="0"/>
+        </a:xfrm>
+      </p:grpSpPr>
+      <p:sp>
+        <p:nvSpPr>
+          <p:cNvPr id="2" name="Slide Image Placeholder 1"/>
+          <p:cNvSpPr>
+            <a:spLocks noGrp="1" noRot="1" noChangeAspect="1"/>
+          </p:cNvSpPr>
+          <p:nvPr>
+            <p:ph type="sldImg"/>
+          </p:nvPr>
+        </p:nvSpPr>
+        <p:spPr/>
+      </p:sp>
+      <p:sp>
+        <p:nvSpPr>
+          <p:cNvPr id="3" name="Notes Placeholder 2"/>
+          <p:cNvSpPr>
+            <a:spLocks noGrp="1"/>
+          </p:cNvSpPr>
+          <p:nvPr>
+            <p:ph type="body" idx="1"/>
+          </p:nvPr>
+        </p:nvSpPr>
+        <p:spPr/>
+        <p:txBody>
+          <a:bodyPr/>
+          <a:lstStyle/>
+          <a:p>
+            <a:r>
+              <a:rPr lang="fr-FR" dirty="0" err="1"/>
+              <a:t>Sensationalisation</a:t>
+            </a:r>
+            <a:r>
+              <a:rPr lang="fr-FR" dirty="0"/>
+              <a:t> of </a:t>
+            </a:r>
+            <a:r>
+              <a:rPr lang="fr-FR" dirty="0" err="1"/>
+              <a:t>what</a:t>
+            </a:r>
+            <a:r>
+              <a:rPr lang="fr-FR" dirty="0"/>
+              <a:t> </a:t>
+            </a:r>
+            <a:r>
+              <a:rPr lang="fr-FR" dirty="0" err="1"/>
+              <a:t>we</a:t>
+            </a:r>
+            <a:r>
+              <a:rPr lang="fr-FR" dirty="0"/>
+              <a:t> </a:t>
+            </a:r>
+            <a:r>
+              <a:rPr lang="fr-FR" dirty="0" err="1"/>
+              <a:t>work</a:t>
+            </a:r>
+            <a:r>
+              <a:rPr lang="fr-FR" dirty="0"/>
+              <a:t> in.</a:t>
+            </a:r>
+          </a:p>
+          <a:p>
+            <a:r>
+              <a:rPr lang="fr-FR" dirty="0" err="1"/>
+              <a:t>Having</a:t>
+            </a:r>
+            <a:r>
+              <a:rPr lang="fr-FR" dirty="0"/>
+              <a:t> an incident hit the media (ie. </a:t>
+            </a:r>
+            <a:r>
+              <a:rPr lang="fr-FR" dirty="0" err="1"/>
+              <a:t>FB’s</a:t>
+            </a:r>
+            <a:r>
+              <a:rPr lang="fr-FR" dirty="0"/>
+              <a:t> BGP </a:t>
+            </a:r>
+            <a:r>
+              <a:rPr lang="fr-FR" dirty="0" err="1"/>
+              <a:t>outage</a:t>
+            </a:r>
+            <a:r>
+              <a:rPr lang="fr-FR" dirty="0"/>
+              <a:t>) </a:t>
+            </a:r>
+            <a:r>
+              <a:rPr lang="fr-FR" dirty="0" err="1"/>
+              <a:t>is</a:t>
+            </a:r>
+            <a:r>
+              <a:rPr lang="fr-FR" dirty="0"/>
+              <a:t> </a:t>
+            </a:r>
+            <a:r>
+              <a:rPr lang="fr-FR" dirty="0" err="1"/>
+              <a:t>often</a:t>
+            </a:r>
+            <a:r>
+              <a:rPr lang="fr-FR" dirty="0"/>
+              <a:t> a source for </a:t>
+            </a:r>
+            <a:r>
+              <a:rPr lang="fr-FR" dirty="0" err="1"/>
+              <a:t>speculation</a:t>
+            </a:r>
+            <a:r>
+              <a:rPr lang="fr-FR" dirty="0"/>
+              <a:t>. Reporters </a:t>
+            </a:r>
+            <a:r>
+              <a:rPr lang="fr-FR" dirty="0" err="1"/>
+              <a:t>should</a:t>
+            </a:r>
+            <a:r>
+              <a:rPr lang="fr-FR" dirty="0"/>
+              <a:t> of course practice due diligence but </a:t>
+            </a:r>
+            <a:r>
+              <a:rPr lang="fr-FR" dirty="0" err="1"/>
+              <a:t>it’s</a:t>
+            </a:r>
+            <a:r>
+              <a:rPr lang="fr-FR" dirty="0"/>
+              <a:t> </a:t>
+            </a:r>
+            <a:r>
+              <a:rPr lang="fr-FR" dirty="0" err="1"/>
+              <a:t>often</a:t>
+            </a:r>
+            <a:r>
+              <a:rPr lang="fr-FR" dirty="0"/>
+              <a:t> hard </a:t>
+            </a:r>
+            <a:r>
+              <a:rPr lang="fr-FR" dirty="0" err="1"/>
+              <a:t>when</a:t>
+            </a:r>
+            <a:r>
+              <a:rPr lang="fr-FR" dirty="0"/>
+              <a:t> the topic </a:t>
+            </a:r>
+            <a:r>
+              <a:rPr lang="fr-FR" dirty="0" err="1"/>
+              <a:t>is</a:t>
+            </a:r>
+            <a:r>
+              <a:rPr lang="fr-FR" dirty="0"/>
+              <a:t> </a:t>
+            </a:r>
+            <a:r>
+              <a:rPr lang="fr-FR" dirty="0" err="1"/>
+              <a:t>so</a:t>
+            </a:r>
+            <a:r>
+              <a:rPr lang="fr-FR" dirty="0"/>
+              <a:t> far </a:t>
+            </a:r>
+            <a:r>
+              <a:rPr lang="fr-FR" dirty="0" err="1"/>
+              <a:t>removed</a:t>
+            </a:r>
+            <a:r>
+              <a:rPr lang="fr-FR" dirty="0"/>
+              <a:t> </a:t>
+            </a:r>
+            <a:r>
+              <a:rPr lang="fr-FR" dirty="0" err="1"/>
+              <a:t>from</a:t>
+            </a:r>
+            <a:r>
+              <a:rPr lang="fr-FR" dirty="0"/>
+              <a:t> the people </a:t>
+            </a:r>
+            <a:r>
+              <a:rPr lang="fr-FR" dirty="0" err="1"/>
+              <a:t>they</a:t>
+            </a:r>
+            <a:r>
+              <a:rPr lang="fr-FR" dirty="0"/>
+              <a:t> are </a:t>
+            </a:r>
+            <a:r>
+              <a:rPr lang="fr-FR" dirty="0" err="1"/>
+              <a:t>writing</a:t>
+            </a:r>
+            <a:r>
+              <a:rPr lang="fr-FR" dirty="0"/>
+              <a:t> to. (Not </a:t>
+            </a:r>
+            <a:r>
+              <a:rPr lang="fr-FR" dirty="0" err="1"/>
+              <a:t>everyone</a:t>
+            </a:r>
+            <a:r>
+              <a:rPr lang="fr-FR" dirty="0"/>
+              <a:t> </a:t>
+            </a:r>
+            <a:r>
+              <a:rPr lang="fr-FR" dirty="0" err="1"/>
+              <a:t>is</a:t>
+            </a:r>
+            <a:r>
+              <a:rPr lang="fr-FR" dirty="0"/>
+              <a:t> </a:t>
+            </a:r>
+            <a:r>
+              <a:rPr lang="fr-FR" dirty="0" err="1"/>
+              <a:t>technical</a:t>
+            </a:r>
+            <a:r>
+              <a:rPr lang="fr-FR" dirty="0"/>
+              <a:t>).</a:t>
+            </a:r>
+          </a:p>
+          <a:p>
+            <a:endParaRPr lang="fr-CH" dirty="0"/>
+          </a:p>
+          <a:p>
+            <a:r>
+              <a:rPr lang="fr-CH" dirty="0" err="1"/>
+              <a:t>TrustedSec</a:t>
+            </a:r>
+            <a:r>
+              <a:rPr lang="fr-CH" dirty="0"/>
+              <a:t>: </a:t>
+            </a:r>
+          </a:p>
+          <a:p>
+            <a:endParaRPr lang="fr-CH" dirty="0"/>
+          </a:p>
+          <a:p>
+            <a:endParaRPr lang="en-CH" dirty="0"/>
+          </a:p>
+        </p:txBody>
+      </p:sp>
+      <p:sp>
+        <p:nvSpPr>
+          <p:cNvPr id="4" name="Slide Number Placeholder 3"/>
+          <p:cNvSpPr>
+            <a:spLocks noGrp="1"/>
+          </p:cNvSpPr>
+          <p:nvPr>
+            <p:ph type="sldNum" sz="quarter" idx="5"/>
+          </p:nvPr>
+        </p:nvSpPr>
+        <p:spPr/>
+        <p:txBody>
+          <a:bodyPr/>
+          <a:lstStyle/>
+          <a:p>
+            <a:fld id="{0694DDBD-909C-4A4E-B2D7-F99DF96BAE15}" type="slidenum">
+              <a:rPr lang="fr-FR" smtClean="0"/>
+              <a:t>5</a:t>
+            </a:fld>
+            <a:endParaRPr lang="fr-FR"/>
+          </a:p>
+        </p:txBody>
+      </p:sp>
+    </p:spTree>
+    <p:extLst>
+      <p:ext uri="{BB962C8B-B14F-4D97-AF65-F5344CB8AC3E}">
+        <p14:creationId xmlns:p14="http://schemas.microsoft.com/office/powerpoint/2010/main" val="798315406"/>
       </p:ext>
     </p:extLst>
   </p:cSld>
@@ -1362,7 +1706,7 @@
           <a:p>
             <a:fld id="{F28962E3-3140-45C1-A806-0EEA07C9BA09}" type="datetimeFigureOut">
               <a:rPr lang="fr-FR" smtClean="0"/>
-              <a:t>03/02/2022</a:t>
+              <a:t>04/02/2022</a:t>
             </a:fld>
             <a:endParaRPr lang="fr-FR"/>
           </a:p>
@@ -1660,7 +2004,7 @@
           <a:p>
             <a:fld id="{F28962E3-3140-45C1-A806-0EEA07C9BA09}" type="datetimeFigureOut">
               <a:rPr lang="fr-FR" smtClean="0"/>
-              <a:t>03/02/2022</a:t>
+              <a:t>04/02/2022</a:t>
             </a:fld>
             <a:endParaRPr lang="fr-FR"/>
           </a:p>
@@ -1852,7 +2196,7 @@
           <a:p>
             <a:fld id="{F28962E3-3140-45C1-A806-0EEA07C9BA09}" type="datetimeFigureOut">
               <a:rPr lang="fr-FR" smtClean="0"/>
-              <a:t>03/02/2022</a:t>
+              <a:t>04/02/2022</a:t>
             </a:fld>
             <a:endParaRPr lang="fr-FR"/>
           </a:p>
@@ -2113,7 +2457,7 @@
           <a:p>
             <a:fld id="{F28962E3-3140-45C1-A806-0EEA07C9BA09}" type="datetimeFigureOut">
               <a:rPr lang="fr-FR" smtClean="0"/>
-              <a:t>03/02/2022</a:t>
+              <a:t>04/02/2022</a:t>
             </a:fld>
             <a:endParaRPr lang="fr-FR"/>
           </a:p>
@@ -2537,7 +2881,7 @@
           <a:p>
             <a:fld id="{F28962E3-3140-45C1-A806-0EEA07C9BA09}" type="datetimeFigureOut">
               <a:rPr lang="fr-FR" smtClean="0"/>
-              <a:t>03/02/2022</a:t>
+              <a:t>04/02/2022</a:t>
             </a:fld>
             <a:endParaRPr lang="fr-FR"/>
           </a:p>
@@ -3074,7 +3418,7 @@
           <a:p>
             <a:fld id="{F28962E3-3140-45C1-A806-0EEA07C9BA09}" type="datetimeFigureOut">
               <a:rPr lang="fr-FR" smtClean="0"/>
-              <a:t>03/02/2022</a:t>
+              <a:t>04/02/2022</a:t>
             </a:fld>
             <a:endParaRPr lang="fr-FR"/>
           </a:p>
@@ -3938,7 +4282,7 @@
           <a:p>
             <a:fld id="{F28962E3-3140-45C1-A806-0EEA07C9BA09}" type="datetimeFigureOut">
               <a:rPr lang="fr-FR" smtClean="0"/>
-              <a:t>03/02/2022</a:t>
+              <a:t>04/02/2022</a:t>
             </a:fld>
             <a:endParaRPr lang="fr-FR"/>
           </a:p>
@@ -4108,7 +4452,7 @@
           <a:p>
             <a:fld id="{F28962E3-3140-45C1-A806-0EEA07C9BA09}" type="datetimeFigureOut">
               <a:rPr lang="fr-FR" smtClean="0"/>
-              <a:t>03/02/2022</a:t>
+              <a:t>04/02/2022</a:t>
             </a:fld>
             <a:endParaRPr lang="fr-FR"/>
           </a:p>
@@ -4292,7 +4636,7 @@
           <a:p>
             <a:fld id="{F28962E3-3140-45C1-A806-0EEA07C9BA09}" type="datetimeFigureOut">
               <a:rPr lang="fr-FR" smtClean="0"/>
-              <a:t>03/02/2022</a:t>
+              <a:t>04/02/2022</a:t>
             </a:fld>
             <a:endParaRPr lang="fr-FR"/>
           </a:p>
@@ -4462,7 +4806,7 @@
           <a:p>
             <a:fld id="{F28962E3-3140-45C1-A806-0EEA07C9BA09}" type="datetimeFigureOut">
               <a:rPr lang="fr-FR" smtClean="0"/>
-              <a:t>03/02/2022</a:t>
+              <a:t>04/02/2022</a:t>
             </a:fld>
             <a:endParaRPr lang="fr-FR"/>
           </a:p>
@@ -4706,7 +5050,7 @@
           <a:p>
             <a:fld id="{F28962E3-3140-45C1-A806-0EEA07C9BA09}" type="datetimeFigureOut">
               <a:rPr lang="fr-FR" smtClean="0"/>
-              <a:t>03/02/2022</a:t>
+              <a:t>04/02/2022</a:t>
             </a:fld>
             <a:endParaRPr lang="fr-FR"/>
           </a:p>
@@ -4942,7 +5286,7 @@
           <a:p>
             <a:fld id="{F28962E3-3140-45C1-A806-0EEA07C9BA09}" type="datetimeFigureOut">
               <a:rPr lang="fr-FR" smtClean="0"/>
-              <a:t>03/02/2022</a:t>
+              <a:t>04/02/2022</a:t>
             </a:fld>
             <a:endParaRPr lang="fr-FR"/>
           </a:p>
@@ -5408,7 +5752,7 @@
           <a:p>
             <a:fld id="{F28962E3-3140-45C1-A806-0EEA07C9BA09}" type="datetimeFigureOut">
               <a:rPr lang="fr-FR" smtClean="0"/>
-              <a:t>03/02/2022</a:t>
+              <a:t>04/02/2022</a:t>
             </a:fld>
             <a:endParaRPr lang="fr-FR"/>
           </a:p>
@@ -5526,7 +5870,7 @@
           <a:p>
             <a:fld id="{F28962E3-3140-45C1-A806-0EEA07C9BA09}" type="datetimeFigureOut">
               <a:rPr lang="fr-FR" smtClean="0"/>
-              <a:t>03/02/2022</a:t>
+              <a:t>04/02/2022</a:t>
             </a:fld>
             <a:endParaRPr lang="fr-FR"/>
           </a:p>
@@ -5621,7 +5965,7 @@
           <a:p>
             <a:fld id="{F28962E3-3140-45C1-A806-0EEA07C9BA09}" type="datetimeFigureOut">
               <a:rPr lang="fr-FR" smtClean="0"/>
-              <a:t>03/02/2022</a:t>
+              <a:t>04/02/2022</a:t>
             </a:fld>
             <a:endParaRPr lang="fr-FR"/>
           </a:p>
@@ -5876,7 +6220,7 @@
           <a:p>
             <a:fld id="{F28962E3-3140-45C1-A806-0EEA07C9BA09}" type="datetimeFigureOut">
               <a:rPr lang="fr-FR" smtClean="0"/>
-              <a:t>03/02/2022</a:t>
+              <a:t>04/02/2022</a:t>
             </a:fld>
             <a:endParaRPr lang="fr-FR"/>
           </a:p>
@@ -6176,7 +6520,7 @@
           <a:p>
             <a:fld id="{F28962E3-3140-45C1-A806-0EEA07C9BA09}" type="datetimeFigureOut">
               <a:rPr lang="fr-FR" smtClean="0"/>
-              <a:t>03/02/2022</a:t>
+              <a:t>04/02/2022</a:t>
             </a:fld>
             <a:endParaRPr lang="fr-FR"/>
           </a:p>
@@ -6410,7 +6754,7 @@
           <a:p>
             <a:fld id="{F28962E3-3140-45C1-A806-0EEA07C9BA09}" type="datetimeFigureOut">
               <a:rPr lang="fr-FR" smtClean="0"/>
-              <a:t>03/02/2022</a:t>
+              <a:t>04/02/2022</a:t>
             </a:fld>
             <a:endParaRPr lang="fr-FR"/>
           </a:p>
@@ -7819,6 +8163,182 @@
 </p:sld>
 </file>
 
+<file path=ppt/slides/slide5.xml><?xml version="1.0" encoding="utf-8"?>
+<p:sld xmlns:a="http://schemas.openxmlformats.org/drawingml/2006/main" xmlns:r="http://schemas.openxmlformats.org/officeDocument/2006/relationships" xmlns:p="http://schemas.openxmlformats.org/presentationml/2006/main">
+  <p:cSld>
+    <p:spTree>
+      <p:nvGrpSpPr>
+        <p:cNvPr id="1" name=""/>
+        <p:cNvGrpSpPr/>
+        <p:nvPr/>
+      </p:nvGrpSpPr>
+      <p:grpSpPr>
+        <a:xfrm>
+          <a:off x="0" y="0"/>
+          <a:ext cx="0" cy="0"/>
+          <a:chOff x="0" y="0"/>
+          <a:chExt cx="0" cy="0"/>
+        </a:xfrm>
+      </p:grpSpPr>
+      <p:sp>
+        <p:nvSpPr>
+          <p:cNvPr id="4" name="Title 3">
+            <a:extLst>
+              <a:ext uri="{FF2B5EF4-FFF2-40B4-BE49-F238E27FC236}">
+                <a16:creationId xmlns:a16="http://schemas.microsoft.com/office/drawing/2014/main" id="{7B94CA22-C42F-49A2-9B70-8E8664F1DB49}"/>
+              </a:ext>
+            </a:extLst>
+          </p:cNvPr>
+          <p:cNvSpPr>
+            <a:spLocks noGrp="1"/>
+          </p:cNvSpPr>
+          <p:nvPr>
+            <p:ph type="title"/>
+          </p:nvPr>
+        </p:nvSpPr>
+        <p:spPr/>
+        <p:txBody>
+          <a:bodyPr/>
+          <a:lstStyle/>
+          <a:p>
+            <a:r>
+              <a:rPr lang="fr-CH" dirty="0"/>
+              <a:t>ECHO CHAMBERS</a:t>
+            </a:r>
+            <a:endParaRPr lang="en-CH" dirty="0"/>
+          </a:p>
+        </p:txBody>
+      </p:sp>
+      <p:sp>
+        <p:nvSpPr>
+          <p:cNvPr id="5" name="Text Placeholder 4">
+            <a:extLst>
+              <a:ext uri="{FF2B5EF4-FFF2-40B4-BE49-F238E27FC236}">
+                <a16:creationId xmlns:a16="http://schemas.microsoft.com/office/drawing/2014/main" id="{DEC068D7-8675-4CC7-A8D3-7728C5D65EDA}"/>
+              </a:ext>
+            </a:extLst>
+          </p:cNvPr>
+          <p:cNvSpPr>
+            <a:spLocks noGrp="1"/>
+          </p:cNvSpPr>
+          <p:nvPr>
+            <p:ph type="body" idx="1"/>
+          </p:nvPr>
+        </p:nvSpPr>
+        <p:spPr/>
+        <p:txBody>
+          <a:bodyPr/>
+          <a:lstStyle/>
+          <a:p>
+            <a:r>
+              <a:rPr lang="fr-CH" dirty="0"/>
+              <a:t>SENSATIONALISM</a:t>
+            </a:r>
+            <a:endParaRPr lang="en-CH" dirty="0"/>
+          </a:p>
+        </p:txBody>
+      </p:sp>
+    </p:spTree>
+    <p:extLst>
+      <p:ext uri="{BB962C8B-B14F-4D97-AF65-F5344CB8AC3E}">
+        <p14:creationId xmlns:p14="http://schemas.microsoft.com/office/powerpoint/2010/main" val="1396464949"/>
+      </p:ext>
+    </p:extLst>
+  </p:cSld>
+  <p:clrMapOvr>
+    <a:masterClrMapping/>
+  </p:clrMapOvr>
+</p:sld>
+</file>
+
+<file path=ppt/slides/slide6.xml><?xml version="1.0" encoding="utf-8"?>
+<p:sld xmlns:a="http://schemas.openxmlformats.org/drawingml/2006/main" xmlns:r="http://schemas.openxmlformats.org/officeDocument/2006/relationships" xmlns:p="http://schemas.openxmlformats.org/presentationml/2006/main">
+  <p:cSld>
+    <p:spTree>
+      <p:nvGrpSpPr>
+        <p:cNvPr id="1" name=""/>
+        <p:cNvGrpSpPr/>
+        <p:nvPr/>
+      </p:nvGrpSpPr>
+      <p:grpSpPr>
+        <a:xfrm>
+          <a:off x="0" y="0"/>
+          <a:ext cx="0" cy="0"/>
+          <a:chOff x="0" y="0"/>
+          <a:chExt cx="0" cy="0"/>
+        </a:xfrm>
+      </p:grpSpPr>
+      <p:sp>
+        <p:nvSpPr>
+          <p:cNvPr id="2" name="Title 1">
+            <a:extLst>
+              <a:ext uri="{FF2B5EF4-FFF2-40B4-BE49-F238E27FC236}">
+                <a16:creationId xmlns:a16="http://schemas.microsoft.com/office/drawing/2014/main" id="{452F2FDF-60B4-472D-98EF-13C9DDB3B772}"/>
+              </a:ext>
+            </a:extLst>
+          </p:cNvPr>
+          <p:cNvSpPr>
+            <a:spLocks noGrp="1"/>
+          </p:cNvSpPr>
+          <p:nvPr>
+            <p:ph type="title"/>
+          </p:nvPr>
+        </p:nvSpPr>
+        <p:spPr/>
+        <p:txBody>
+          <a:bodyPr/>
+          <a:lstStyle/>
+          <a:p>
+            <a:r>
+              <a:rPr lang="fr-CH" dirty="0"/>
+              <a:t>LIMITING INADVERTENT FUEL</a:t>
+            </a:r>
+            <a:endParaRPr lang="en-CH" dirty="0"/>
+          </a:p>
+        </p:txBody>
+      </p:sp>
+      <p:sp>
+        <p:nvSpPr>
+          <p:cNvPr id="3" name="Text Placeholder 2">
+            <a:extLst>
+              <a:ext uri="{FF2B5EF4-FFF2-40B4-BE49-F238E27FC236}">
+                <a16:creationId xmlns:a16="http://schemas.microsoft.com/office/drawing/2014/main" id="{B39D28DD-CAFD-4E36-B210-76955EEB7846}"/>
+              </a:ext>
+            </a:extLst>
+          </p:cNvPr>
+          <p:cNvSpPr>
+            <a:spLocks noGrp="1"/>
+          </p:cNvSpPr>
+          <p:nvPr>
+            <p:ph type="body" idx="1"/>
+          </p:nvPr>
+        </p:nvSpPr>
+        <p:spPr/>
+        <p:txBody>
+          <a:bodyPr/>
+          <a:lstStyle/>
+          <a:p>
+            <a:r>
+              <a:rPr lang="fr-CH" dirty="0"/>
+              <a:t>SAFEGUARDS</a:t>
+            </a:r>
+            <a:endParaRPr lang="en-CH" dirty="0"/>
+          </a:p>
+        </p:txBody>
+      </p:sp>
+    </p:spTree>
+    <p:extLst>
+      <p:ext uri="{BB962C8B-B14F-4D97-AF65-F5344CB8AC3E}">
+        <p14:creationId xmlns:p14="http://schemas.microsoft.com/office/powerpoint/2010/main" val="925066322"/>
+      </p:ext>
+    </p:extLst>
+  </p:cSld>
+  <p:clrMapOvr>
+    <a:masterClrMapping/>
+  </p:clrMapOvr>
+</p:sld>
+</file>
+
 <file path=ppt/theme/theme1.xml><?xml version="1.0" encoding="utf-8"?>
 <a:theme xmlns:a="http://schemas.openxmlformats.org/drawingml/2006/main" name="Slate">
   <a:themeElements>

</xml_diff>